<commit_message>
Quad chart for TR
</commit_message>
<xml_diff>
--- a/research/GRA Thomson Reuters/Admin/Quad.pptx
+++ b/research/GRA Thomson Reuters/Admin/Quad.pptx
@@ -837,8 +837,8 @@
           <a:lstStyle/>
           <a:p>
             <a:r>
-              <a:rPr lang="en-US" dirty="0" smtClean="0"/>
-              <a:t>&lt;Project Title&gt;</a:t>
+              <a:rPr lang="en-US" dirty="0"/>
+              <a:t>Assistive Agents for Self-Represented Litigants</a:t>
             </a:r>
             <a:endParaRPr lang="en-US" dirty="0"/>
           </a:p>
@@ -852,8 +852,8 @@
         </p:nvSpPr>
         <p:spPr>
           <a:xfrm>
-            <a:off x="4660042" y="3716663"/>
-            <a:ext cx="3829050" cy="584775"/>
+            <a:off x="4660041" y="3716663"/>
+            <a:ext cx="3883884" cy="1323439"/>
           </a:xfrm>
           <a:prstGeom prst="rect">
             <a:avLst/>
@@ -868,8 +868,9 @@
           <a:p>
             <a:r>
               <a:rPr lang="en-US" sz="1600" b="1" dirty="0" smtClean="0"/>
-              <a:t>Text</a:t>
-            </a:r>
+              <a:t>Benefits to IAB</a:t>
+            </a:r>
+            <a:endParaRPr lang="en-US" sz="1600" b="1" dirty="0" smtClean="0"/>
           </a:p>
           <a:p>
             <a:pPr marL="285750" indent="-285750">
@@ -877,10 +878,64 @@
               <a:buChar char="•"/>
             </a:pPr>
             <a:r>
-              <a:rPr lang="en-US" sz="1600" b="0" dirty="0" smtClean="0"/>
-              <a:t>Text</a:t>
-            </a:r>
-            <a:endParaRPr lang="en-US" sz="1600" b="0" dirty="0"/>
+              <a:rPr lang="en-US" sz="1600" dirty="0" smtClean="0"/>
+              <a:t>More positive legal </a:t>
+            </a:r>
+            <a:r>
+              <a:rPr lang="en-US" sz="1600" dirty="0"/>
+              <a:t>outcomes for </a:t>
+            </a:r>
+            <a:r>
+              <a:rPr lang="en-US" sz="1600" dirty="0" smtClean="0"/>
+              <a:t>SRL’s</a:t>
+            </a:r>
+          </a:p>
+          <a:p>
+            <a:pPr marL="285750" indent="-285750">
+              <a:buFont typeface="Arial" panose="020B0604020202020204" pitchFamily="34" charset="0"/>
+              <a:buChar char="•"/>
+            </a:pPr>
+            <a:r>
+              <a:rPr lang="en-US" sz="1600" dirty="0" smtClean="0"/>
+              <a:t>More access </a:t>
+            </a:r>
+            <a:r>
+              <a:rPr lang="en-US" sz="1600" dirty="0"/>
+              <a:t>to legal services for SRL’s</a:t>
+            </a:r>
+          </a:p>
+          <a:p>
+            <a:pPr marL="285750" indent="-285750">
+              <a:buFont typeface="Arial" panose="020B0604020202020204" pitchFamily="34" charset="0"/>
+              <a:buChar char="•"/>
+            </a:pPr>
+            <a:r>
+              <a:rPr lang="en-US" sz="1600" dirty="0" smtClean="0"/>
+              <a:t>Ability to use </a:t>
+            </a:r>
+            <a:r>
+              <a:rPr lang="en-US" sz="1600" dirty="0"/>
+              <a:t>MDP’s </a:t>
+            </a:r>
+            <a:r>
+              <a:rPr lang="en-US" sz="1600" dirty="0" smtClean="0"/>
+              <a:t>for human </a:t>
+            </a:r>
+            <a:r>
+              <a:rPr lang="en-US" sz="1600" dirty="0"/>
+              <a:t>systems</a:t>
+            </a:r>
+          </a:p>
+          <a:p>
+            <a:pPr marL="285750" indent="-285750">
+              <a:buFont typeface="Arial" panose="020B0604020202020204" pitchFamily="34" charset="0"/>
+              <a:buChar char="•"/>
+            </a:pPr>
+            <a:r>
+              <a:rPr lang="en-US" sz="1600" dirty="0" smtClean="0"/>
+              <a:t>Proof of concept in creating SRL assistant</a:t>
+            </a:r>
+            <a:endParaRPr lang="en-US" sz="1600" dirty="0"/>
           </a:p>
         </p:txBody>
       </p:sp>
@@ -893,7 +948,7 @@
         <p:spPr>
           <a:xfrm>
             <a:off x="4660042" y="1216479"/>
-            <a:ext cx="3829050" cy="584775"/>
+            <a:ext cx="3829050" cy="1323439"/>
           </a:xfrm>
           <a:prstGeom prst="rect">
             <a:avLst/>
@@ -908,8 +963,9 @@
           <a:p>
             <a:r>
               <a:rPr lang="en-US" sz="1600" b="1" dirty="0" smtClean="0"/>
-              <a:t>Text</a:t>
-            </a:r>
+              <a:t>Novelty of Approach</a:t>
+            </a:r>
+            <a:endParaRPr lang="en-US" sz="1600" b="1" dirty="0" smtClean="0"/>
           </a:p>
           <a:p>
             <a:pPr marL="285750" indent="-285750">
@@ -918,7 +974,17 @@
             </a:pPr>
             <a:r>
               <a:rPr lang="en-US" sz="1600" b="0" dirty="0" smtClean="0"/>
-              <a:t>Text</a:t>
+              <a:t>By seeing human agents as RL’s we can use existing research to explain behavior</a:t>
+            </a:r>
+          </a:p>
+          <a:p>
+            <a:pPr marL="285750" indent="-285750">
+              <a:buFont typeface="Arial" panose="020B0604020202020204" pitchFamily="34" charset="0"/>
+              <a:buChar char="•"/>
+            </a:pPr>
+            <a:r>
+              <a:rPr lang="en-US" sz="1600" dirty="0" smtClean="0"/>
+              <a:t>Because the RL framework is built for computers software can understand it</a:t>
             </a:r>
             <a:endParaRPr lang="en-US" sz="1600" b="0" dirty="0"/>
           </a:p>
@@ -933,7 +999,7 @@
         <p:spPr>
           <a:xfrm>
             <a:off x="742950" y="3716663"/>
-            <a:ext cx="3829050" cy="584775"/>
+            <a:ext cx="3829050" cy="1323439"/>
           </a:xfrm>
           <a:prstGeom prst="rect">
             <a:avLst/>
@@ -948,8 +1014,9 @@
           <a:p>
             <a:r>
               <a:rPr lang="en-US" sz="1600" b="1" dirty="0" smtClean="0"/>
-              <a:t>Text</a:t>
-            </a:r>
+              <a:t>Deliverables</a:t>
+            </a:r>
+            <a:endParaRPr lang="en-US" sz="1600" b="1" dirty="0" smtClean="0"/>
           </a:p>
           <a:p>
             <a:pPr marL="285750" indent="-285750">
@@ -957,8 +1024,72 @@
               <a:buChar char="•"/>
             </a:pPr>
             <a:r>
-              <a:rPr lang="en-US" sz="1600" b="0" dirty="0" smtClean="0"/>
-              <a:t>Text</a:t>
+              <a:rPr lang="en-US" sz="1600" dirty="0"/>
+              <a:t>A framework for </a:t>
+            </a:r>
+            <a:r>
+              <a:rPr lang="en-US" sz="1600" dirty="0" smtClean="0"/>
+              <a:t>estimating SRL goals</a:t>
+            </a:r>
+            <a:endParaRPr lang="en-US" sz="1600" dirty="0"/>
+          </a:p>
+          <a:p>
+            <a:pPr marL="285750" indent="-285750">
+              <a:buFont typeface="Arial" panose="020B0604020202020204" pitchFamily="34" charset="0"/>
+              <a:buChar char="•"/>
+            </a:pPr>
+            <a:r>
+              <a:rPr lang="en-US" sz="1600" dirty="0"/>
+              <a:t>An MDP </a:t>
+            </a:r>
+            <a:r>
+              <a:rPr lang="en-US" sz="1600" dirty="0" smtClean="0"/>
+              <a:t>which captures </a:t>
+            </a:r>
+            <a:r>
+              <a:rPr lang="en-US" sz="1600" dirty="0"/>
+              <a:t>the SRL process</a:t>
+            </a:r>
+          </a:p>
+          <a:p>
+            <a:pPr marL="285750" indent="-285750">
+              <a:buFont typeface="Arial" panose="020B0604020202020204" pitchFamily="34" charset="0"/>
+              <a:buChar char="•"/>
+            </a:pPr>
+            <a:r>
+              <a:rPr lang="en-US" sz="1600" dirty="0"/>
+              <a:t>Source code </a:t>
+            </a:r>
+            <a:r>
+              <a:rPr lang="en-US" sz="1600" dirty="0" smtClean="0"/>
+              <a:t>to </a:t>
+            </a:r>
+            <a:r>
+              <a:rPr lang="en-US" sz="1600" dirty="0"/>
+              <a:t>determine SRL </a:t>
+            </a:r>
+            <a:r>
+              <a:rPr lang="en-US" sz="1600" dirty="0" smtClean="0"/>
+              <a:t>goals</a:t>
+            </a:r>
+            <a:endParaRPr lang="en-US" sz="1600" dirty="0"/>
+          </a:p>
+          <a:p>
+            <a:pPr marL="285750" indent="-285750">
+              <a:buFont typeface="Arial" panose="020B0604020202020204" pitchFamily="34" charset="0"/>
+              <a:buChar char="•"/>
+            </a:pPr>
+            <a:r>
+              <a:rPr lang="en-US" sz="1600" dirty="0"/>
+              <a:t>Submission </a:t>
+            </a:r>
+            <a:r>
+              <a:rPr lang="en-US" sz="1600" dirty="0" smtClean="0"/>
+              <a:t>to the </a:t>
+            </a:r>
+            <a:r>
+              <a:rPr lang="en-US" sz="1600" dirty="0"/>
+              <a:t>2018 TIG Conference</a:t>
             </a:r>
             <a:endParaRPr lang="en-US" sz="1600" b="0" dirty="0"/>
           </a:p>
@@ -972,8 +1103,8 @@
         </p:nvSpPr>
         <p:spPr>
           <a:xfrm>
-            <a:off x="895350" y="1368879"/>
-            <a:ext cx="3829050" cy="584775"/>
+            <a:off x="735330" y="1368879"/>
+            <a:ext cx="3829050" cy="1323439"/>
           </a:xfrm>
           <a:prstGeom prst="rect">
             <a:avLst/>
@@ -988,8 +1119,9 @@
           <a:p>
             <a:r>
               <a:rPr lang="en-US" sz="1600" b="1" dirty="0" smtClean="0"/>
-              <a:t>Text</a:t>
-            </a:r>
+              <a:t>Objectives</a:t>
+            </a:r>
+            <a:endParaRPr lang="en-US" sz="1600" b="1" dirty="0" smtClean="0"/>
           </a:p>
           <a:p>
             <a:pPr marL="285750" indent="-285750">
@@ -997,13 +1129,92 @@
               <a:buChar char="•"/>
             </a:pPr>
             <a:r>
-              <a:rPr lang="en-US" sz="1600" b="0" dirty="0" smtClean="0"/>
-              <a:t>Text</a:t>
-            </a:r>
-            <a:endParaRPr lang="en-US" sz="1600" b="0" dirty="0"/>
+              <a:rPr lang="en-US" sz="1600" dirty="0" smtClean="0"/>
+              <a:t>Show RL application to assistive agents</a:t>
+            </a:r>
+            <a:endParaRPr lang="en-US" sz="1600" dirty="0"/>
+          </a:p>
+          <a:p>
+            <a:pPr marL="285750" indent="-285750">
+              <a:buFont typeface="Arial" panose="020B0604020202020204" pitchFamily="34" charset="0"/>
+              <a:buChar char="•"/>
+            </a:pPr>
+            <a:r>
+              <a:rPr lang="en-US" sz="1600" dirty="0" smtClean="0"/>
+              <a:t>Discover SRL goals from behavior</a:t>
+            </a:r>
+          </a:p>
+          <a:p>
+            <a:pPr marL="285750" indent="-285750">
+              <a:buFont typeface="Arial" panose="020B0604020202020204" pitchFamily="34" charset="0"/>
+              <a:buChar char="•"/>
+            </a:pPr>
+            <a:r>
+              <a:rPr lang="en-US" sz="1600" dirty="0" smtClean="0"/>
+              <a:t>Find new paths of research for assistive agents for Self-represent litigants</a:t>
+            </a:r>
+            <a:endParaRPr lang="en-US" sz="1600" dirty="0"/>
           </a:p>
         </p:txBody>
       </p:sp>
+      <p:pic>
+        <p:nvPicPr>
+          <p:cNvPr id="8" name="Picture 7"/>
+          <p:cNvPicPr>
+            <a:picLocks noChangeAspect="1"/>
+          </p:cNvPicPr>
+          <p:nvPr/>
+        </p:nvPicPr>
+        <p:blipFill>
+          <a:blip r:embed="rId2"/>
+          <a:stretch>
+            <a:fillRect/>
+          </a:stretch>
+        </p:blipFill>
+        <p:spPr>
+          <a:xfrm>
+            <a:off x="4724400" y="2614989"/>
+            <a:ext cx="1810857" cy="843605"/>
+          </a:xfrm>
+          <a:prstGeom prst="rect">
+            <a:avLst/>
+          </a:prstGeom>
+          <a:ln>
+            <a:solidFill>
+              <a:schemeClr val="tx1"/>
+            </a:solidFill>
+          </a:ln>
+        </p:spPr>
+      </p:pic>
+      <p:pic>
+        <p:nvPicPr>
+          <p:cNvPr id="9" name="Picture 8"/>
+          <p:cNvPicPr>
+            <a:picLocks noChangeAspect="1"/>
+          </p:cNvPicPr>
+          <p:nvPr/>
+        </p:nvPicPr>
+        <p:blipFill>
+          <a:blip r:embed="rId3"/>
+          <a:stretch>
+            <a:fillRect/>
+          </a:stretch>
+        </p:blipFill>
+        <p:spPr>
+          <a:xfrm>
+            <a:off x="6629972" y="2620704"/>
+            <a:ext cx="1816941" cy="837855"/>
+          </a:xfrm>
+          <a:prstGeom prst="rect">
+            <a:avLst/>
+          </a:prstGeom>
+          <a:ln>
+            <a:solidFill>
+              <a:schemeClr val="tx1"/>
+            </a:solidFill>
+          </a:ln>
+        </p:spPr>
+      </p:pic>
     </p:spTree>
     <p:extLst>
       <p:ext uri="{BB962C8B-B14F-4D97-AF65-F5344CB8AC3E}">

</xml_diff>